<commit_message>
offer letter, get i2c io expander working, finland figures, exam 4 review done
</commit_message>
<xml_diff>
--- a/SI - 121/Exam 4 Review Ch 9-11.pptx
+++ b/SI - 121/Exam 4 Review Ch 9-11.pptx
@@ -18,6 +18,13 @@
     <p:sldId id="268" r:id="rId12"/>
     <p:sldId id="266" r:id="rId13"/>
     <p:sldId id="267" r:id="rId14"/>
+    <p:sldId id="269" r:id="rId15"/>
+    <p:sldId id="270" r:id="rId16"/>
+    <p:sldId id="271" r:id="rId17"/>
+    <p:sldId id="272" r:id="rId18"/>
+    <p:sldId id="273" r:id="rId19"/>
+    <p:sldId id="274" r:id="rId20"/>
+    <p:sldId id="275" r:id="rId21"/>
   </p:sldIdLst>
   <p:sldSz cx="12192000" cy="6858000"/>
   <p:notesSz cx="6858000" cy="9144000"/>
@@ -255,7 +262,7 @@
           <a:p>
             <a:fld id="{6455B870-2AC2-4EDD-988A-AAB36F68BD8B}" type="datetimeFigureOut">
               <a:rPr lang="en-US" smtClean="0"/>
-              <a:t>4/4/2018</a:t>
+              <a:t>4/9/2018</a:t>
             </a:fld>
             <a:endParaRPr lang="en-US"/>
           </a:p>
@@ -425,7 +432,7 @@
           <a:p>
             <a:fld id="{6455B870-2AC2-4EDD-988A-AAB36F68BD8B}" type="datetimeFigureOut">
               <a:rPr lang="en-US" smtClean="0"/>
-              <a:t>4/4/2018</a:t>
+              <a:t>4/9/2018</a:t>
             </a:fld>
             <a:endParaRPr lang="en-US"/>
           </a:p>
@@ -605,7 +612,7 @@
           <a:p>
             <a:fld id="{6455B870-2AC2-4EDD-988A-AAB36F68BD8B}" type="datetimeFigureOut">
               <a:rPr lang="en-US" smtClean="0"/>
-              <a:t>4/4/2018</a:t>
+              <a:t>4/9/2018</a:t>
             </a:fld>
             <a:endParaRPr lang="en-US"/>
           </a:p>
@@ -775,7 +782,7 @@
           <a:p>
             <a:fld id="{6455B870-2AC2-4EDD-988A-AAB36F68BD8B}" type="datetimeFigureOut">
               <a:rPr lang="en-US" smtClean="0"/>
-              <a:t>4/4/2018</a:t>
+              <a:t>4/9/2018</a:t>
             </a:fld>
             <a:endParaRPr lang="en-US"/>
           </a:p>
@@ -1021,7 +1028,7 @@
           <a:p>
             <a:fld id="{6455B870-2AC2-4EDD-988A-AAB36F68BD8B}" type="datetimeFigureOut">
               <a:rPr lang="en-US" smtClean="0"/>
-              <a:t>4/4/2018</a:t>
+              <a:t>4/9/2018</a:t>
             </a:fld>
             <a:endParaRPr lang="en-US"/>
           </a:p>
@@ -1253,7 +1260,7 @@
           <a:p>
             <a:fld id="{6455B870-2AC2-4EDD-988A-AAB36F68BD8B}" type="datetimeFigureOut">
               <a:rPr lang="en-US" smtClean="0"/>
-              <a:t>4/4/2018</a:t>
+              <a:t>4/9/2018</a:t>
             </a:fld>
             <a:endParaRPr lang="en-US"/>
           </a:p>
@@ -1620,7 +1627,7 @@
           <a:p>
             <a:fld id="{6455B870-2AC2-4EDD-988A-AAB36F68BD8B}" type="datetimeFigureOut">
               <a:rPr lang="en-US" smtClean="0"/>
-              <a:t>4/4/2018</a:t>
+              <a:t>4/9/2018</a:t>
             </a:fld>
             <a:endParaRPr lang="en-US"/>
           </a:p>
@@ -1738,7 +1745,7 @@
           <a:p>
             <a:fld id="{6455B870-2AC2-4EDD-988A-AAB36F68BD8B}" type="datetimeFigureOut">
               <a:rPr lang="en-US" smtClean="0"/>
-              <a:t>4/4/2018</a:t>
+              <a:t>4/9/2018</a:t>
             </a:fld>
             <a:endParaRPr lang="en-US"/>
           </a:p>
@@ -1833,7 +1840,7 @@
           <a:p>
             <a:fld id="{6455B870-2AC2-4EDD-988A-AAB36F68BD8B}" type="datetimeFigureOut">
               <a:rPr lang="en-US" smtClean="0"/>
-              <a:t>4/4/2018</a:t>
+              <a:t>4/9/2018</a:t>
             </a:fld>
             <a:endParaRPr lang="en-US"/>
           </a:p>
@@ -2110,7 +2117,7 @@
           <a:p>
             <a:fld id="{6455B870-2AC2-4EDD-988A-AAB36F68BD8B}" type="datetimeFigureOut">
               <a:rPr lang="en-US" smtClean="0"/>
-              <a:t>4/4/2018</a:t>
+              <a:t>4/9/2018</a:t>
             </a:fld>
             <a:endParaRPr lang="en-US"/>
           </a:p>
@@ -2367,7 +2374,7 @@
           <a:p>
             <a:fld id="{6455B870-2AC2-4EDD-988A-AAB36F68BD8B}" type="datetimeFigureOut">
               <a:rPr lang="en-US" smtClean="0"/>
-              <a:t>4/4/2018</a:t>
+              <a:t>4/9/2018</a:t>
             </a:fld>
             <a:endParaRPr lang="en-US"/>
           </a:p>
@@ -2580,7 +2587,7 @@
           <a:p>
             <a:fld id="{6455B870-2AC2-4EDD-988A-AAB36F68BD8B}" type="datetimeFigureOut">
               <a:rPr lang="en-US" smtClean="0"/>
-              <a:t>4/4/2018</a:t>
+              <a:t>4/9/2018</a:t>
             </a:fld>
             <a:endParaRPr lang="en-US"/>
           </a:p>
@@ -3913,6 +3920,693 @@
 </p:sld>
 </file>
 
+<file path=ppt/slides/slide14.xml><?xml version="1.0" encoding="utf-8"?>
+<p:sld xmlns:a="http://schemas.openxmlformats.org/drawingml/2006/main" xmlns:r="http://schemas.openxmlformats.org/officeDocument/2006/relationships" xmlns:p="http://schemas.openxmlformats.org/presentationml/2006/main">
+  <p:cSld>
+    <p:spTree>
+      <p:nvGrpSpPr>
+        <p:cNvPr id="1" name=""/>
+        <p:cNvGrpSpPr/>
+        <p:nvPr/>
+      </p:nvGrpSpPr>
+      <p:grpSpPr>
+        <a:xfrm>
+          <a:off x="0" y="0"/>
+          <a:ext cx="0" cy="0"/>
+          <a:chOff x="0" y="0"/>
+          <a:chExt cx="0" cy="0"/>
+        </a:xfrm>
+      </p:grpSpPr>
+      <p:sp>
+        <p:nvSpPr>
+          <p:cNvPr id="3" name="Content Placeholder 2">
+            <a:extLst>
+              <a:ext uri="{FF2B5EF4-FFF2-40B4-BE49-F238E27FC236}">
+                <a16:creationId xmlns:a16="http://schemas.microsoft.com/office/drawing/2014/main" id="{095A2F58-F7DF-43DC-BDC6-8BA6397B214D}"/>
+              </a:ext>
+            </a:extLst>
+          </p:cNvPr>
+          <p:cNvSpPr>
+            <a:spLocks noGrp="1"/>
+          </p:cNvSpPr>
+          <p:nvPr>
+            <p:ph idx="1"/>
+          </p:nvPr>
+        </p:nvSpPr>
+        <p:spPr/>
+        <p:txBody>
+          <a:bodyPr/>
+          <a:lstStyle/>
+          <a:p>
+            <a:pPr marL="0" indent="0">
+              <a:buNone/>
+            </a:pPr>
+            <a:r>
+              <a:rPr lang="en-US" dirty="0"/>
+              <a:t>A cylinder rotates with a constant angular speed of 120 rpm. At time t=0s, the disk’s rotational axis begins to experience a constant friction, which causes an angular acceleration of 0.3 rad/s</a:t>
+            </a:r>
+            <a:r>
+              <a:rPr lang="en-US" baseline="30000" dirty="0"/>
+              <a:t>2</a:t>
+            </a:r>
+            <a:r>
+              <a:rPr lang="en-US" dirty="0"/>
+              <a:t>.</a:t>
+            </a:r>
+          </a:p>
+          <a:p>
+            <a:pPr marL="514350" indent="-514350">
+              <a:buFont typeface="+mj-lt"/>
+              <a:buAutoNum type="arabicPeriod"/>
+            </a:pPr>
+            <a:r>
+              <a:rPr lang="en-US" dirty="0"/>
+              <a:t>What is the angular speed of the disk at t=15 s? (8.0664 rad/s)</a:t>
+            </a:r>
+          </a:p>
+          <a:p>
+            <a:pPr marL="514350" indent="-514350">
+              <a:buFont typeface="+mj-lt"/>
+              <a:buAutoNum type="arabicPeriod"/>
+            </a:pPr>
+            <a:r>
+              <a:rPr lang="en-US" dirty="0"/>
+              <a:t>How long does it take the disk to come to a stop? (41.888 s)</a:t>
+            </a:r>
+          </a:p>
+          <a:p>
+            <a:pPr marL="514350" indent="-514350">
+              <a:buFont typeface="+mj-lt"/>
+              <a:buAutoNum type="arabicPeriod"/>
+            </a:pPr>
+            <a:r>
+              <a:rPr lang="en-US" dirty="0"/>
+              <a:t>How many revolutions does the disk make before it comes to a stop? (41 revolutions)</a:t>
+            </a:r>
+          </a:p>
+          <a:p>
+            <a:pPr marL="514350" indent="-514350">
+              <a:buFont typeface="+mj-lt"/>
+              <a:buAutoNum type="arabicPeriod"/>
+            </a:pPr>
+            <a:r>
+              <a:rPr lang="en-US" dirty="0"/>
+              <a:t>How long does it take the disk to complete 10 revolutions? (17.1067 s)</a:t>
+            </a:r>
+          </a:p>
+          <a:p>
+            <a:pPr marL="0" indent="0">
+              <a:buNone/>
+            </a:pPr>
+            <a:endParaRPr lang="en-US" dirty="0"/>
+          </a:p>
+        </p:txBody>
+      </p:sp>
+    </p:spTree>
+    <p:extLst>
+      <p:ext uri="{BB962C8B-B14F-4D97-AF65-F5344CB8AC3E}">
+        <p14:creationId xmlns:p14="http://schemas.microsoft.com/office/powerpoint/2010/main" val="3420801759"/>
+      </p:ext>
+    </p:extLst>
+  </p:cSld>
+  <p:clrMapOvr>
+    <a:masterClrMapping/>
+  </p:clrMapOvr>
+</p:sld>
+</file>
+
+<file path=ppt/slides/slide15.xml><?xml version="1.0" encoding="utf-8"?>
+<p:sld xmlns:a="http://schemas.openxmlformats.org/drawingml/2006/main" xmlns:r="http://schemas.openxmlformats.org/officeDocument/2006/relationships" xmlns:p="http://schemas.openxmlformats.org/presentationml/2006/main">
+  <p:cSld>
+    <p:spTree>
+      <p:nvGrpSpPr>
+        <p:cNvPr id="1" name=""/>
+        <p:cNvGrpSpPr/>
+        <p:nvPr/>
+      </p:nvGrpSpPr>
+      <p:grpSpPr>
+        <a:xfrm>
+          <a:off x="0" y="0"/>
+          <a:ext cx="0" cy="0"/>
+          <a:chOff x="0" y="0"/>
+          <a:chExt cx="0" cy="0"/>
+        </a:xfrm>
+      </p:grpSpPr>
+      <mc:AlternateContent xmlns:mc="http://schemas.openxmlformats.org/markup-compatibility/2006">
+        <mc:Choice xmlns:a14="http://schemas.microsoft.com/office/drawing/2010/main" Requires="a14">
+          <p:sp>
+            <p:nvSpPr>
+              <p:cNvPr id="3" name="Content Placeholder 2">
+                <a:extLst>
+                  <a:ext uri="{FF2B5EF4-FFF2-40B4-BE49-F238E27FC236}">
+                    <a16:creationId xmlns:a16="http://schemas.microsoft.com/office/drawing/2014/main" id="{CC7C923E-3CA8-471B-99CC-B32097C3AB37}"/>
+                  </a:ext>
+                </a:extLst>
+              </p:cNvPr>
+              <p:cNvSpPr>
+                <a:spLocks noGrp="1"/>
+              </p:cNvSpPr>
+              <p:nvPr>
+                <p:ph idx="1"/>
+              </p:nvPr>
+            </p:nvSpPr>
+            <p:spPr/>
+            <p:txBody>
+              <a:bodyPr/>
+              <a:lstStyle/>
+              <a:p>
+                <a:pPr marL="0" indent="0">
+                  <a:buNone/>
+                </a:pPr>
+                <a:r>
+                  <a:rPr lang="en-US" dirty="0"/>
+                  <a:t>The angular velocity of a 755-g wheel 15.0 cm in diameter is given by the equation: </a:t>
+                </a:r>
+                <a14:m>
+                  <m:oMath xmlns:m="http://schemas.openxmlformats.org/officeDocument/2006/math">
+                    <m:r>
+                      <a:rPr lang="en-US" b="0" i="1" smtClean="0">
+                        <a:latin typeface="Cambria Math" panose="02040503050406030204" pitchFamily="18" charset="0"/>
+                      </a:rPr>
+                      <m:t>𝜔</m:t>
+                    </m:r>
+                    <m:d>
+                      <m:dPr>
+                        <m:ctrlPr>
+                          <a:rPr lang="en-US" b="0" i="1" smtClean="0">
+                            <a:latin typeface="Cambria Math" panose="02040503050406030204" pitchFamily="18" charset="0"/>
+                          </a:rPr>
+                        </m:ctrlPr>
+                      </m:dPr>
+                      <m:e>
+                        <m:r>
+                          <a:rPr lang="en-US" b="0" i="1" smtClean="0">
+                            <a:latin typeface="Cambria Math" panose="02040503050406030204" pitchFamily="18" charset="0"/>
+                          </a:rPr>
+                          <m:t>𝑡</m:t>
+                        </m:r>
+                      </m:e>
+                    </m:d>
+                    <m:r>
+                      <a:rPr lang="en-US" b="0" i="1" smtClean="0">
+                        <a:latin typeface="Cambria Math" panose="02040503050406030204" pitchFamily="18" charset="0"/>
+                      </a:rPr>
+                      <m:t>=2</m:t>
+                    </m:r>
+                    <m:r>
+                      <a:rPr lang="en-US" b="0" i="1" smtClean="0">
+                        <a:latin typeface="Cambria Math" panose="02040503050406030204" pitchFamily="18" charset="0"/>
+                      </a:rPr>
+                      <m:t>𝑡</m:t>
+                    </m:r>
+                    <m:r>
+                      <a:rPr lang="en-US" b="0" i="1" smtClean="0">
+                        <a:latin typeface="Cambria Math" panose="02040503050406030204" pitchFamily="18" charset="0"/>
+                      </a:rPr>
+                      <m:t>+1.5</m:t>
+                    </m:r>
+                    <m:sSup>
+                      <m:sSupPr>
+                        <m:ctrlPr>
+                          <a:rPr lang="en-US" b="0" i="1" smtClean="0">
+                            <a:latin typeface="Cambria Math" panose="02040503050406030204" pitchFamily="18" charset="0"/>
+                          </a:rPr>
+                        </m:ctrlPr>
+                      </m:sSupPr>
+                      <m:e>
+                        <m:r>
+                          <a:rPr lang="en-US" b="0" i="1" smtClean="0">
+                            <a:latin typeface="Cambria Math" panose="02040503050406030204" pitchFamily="18" charset="0"/>
+                          </a:rPr>
+                          <m:t>𝑡</m:t>
+                        </m:r>
+                      </m:e>
+                      <m:sup>
+                        <m:r>
+                          <a:rPr lang="en-US" b="0" i="1" smtClean="0">
+                            <a:latin typeface="Cambria Math" panose="02040503050406030204" pitchFamily="18" charset="0"/>
+                          </a:rPr>
+                          <m:t>3</m:t>
+                        </m:r>
+                      </m:sup>
+                    </m:sSup>
+                  </m:oMath>
+                </a14:m>
+                <a:endParaRPr lang="en-US" dirty="0"/>
+              </a:p>
+              <a:p>
+                <a:pPr marL="514350" indent="-514350">
+                  <a:buFont typeface="+mj-lt"/>
+                  <a:buAutoNum type="arabicPeriod"/>
+                </a:pPr>
+                <a:r>
+                  <a:rPr lang="en-US" dirty="0"/>
+                  <a:t>Through how many radians does the wheel turn during the first 2.00 s of its motion? (10 rad)</a:t>
+                </a:r>
+              </a:p>
+              <a:p>
+                <a:pPr marL="514350" indent="-514350">
+                  <a:buFont typeface="+mj-lt"/>
+                  <a:buAutoNum type="arabicPeriod"/>
+                </a:pPr>
+                <a:r>
+                  <a:rPr lang="en-US" dirty="0"/>
+                  <a:t>What is the angular acceleration (in rad/s2) of the wheel at the end of the first 2.00 s of its motion?  (20 rad/s</a:t>
+                </a:r>
+                <a:r>
+                  <a:rPr lang="en-US" baseline="30000" dirty="0"/>
+                  <a:t>2</a:t>
+                </a:r>
+                <a:r>
+                  <a:rPr lang="en-US" dirty="0"/>
+                  <a:t>)</a:t>
+                </a:r>
+              </a:p>
+              <a:p>
+                <a:endParaRPr lang="en-US" dirty="0"/>
+              </a:p>
+            </p:txBody>
+          </p:sp>
+        </mc:Choice>
+        <mc:Fallback>
+          <p:sp>
+            <p:nvSpPr>
+              <p:cNvPr id="3" name="Content Placeholder 2">
+                <a:extLst>
+                  <a:ext uri="{FF2B5EF4-FFF2-40B4-BE49-F238E27FC236}">
+                    <a16:creationId xmlns:a16="http://schemas.microsoft.com/office/drawing/2014/main" id="{CC7C923E-3CA8-471B-99CC-B32097C3AB37}"/>
+                  </a:ext>
+                </a:extLst>
+              </p:cNvPr>
+              <p:cNvSpPr>
+                <a:spLocks noGrp="1" noRot="1" noChangeAspect="1" noMove="1" noResize="1" noEditPoints="1" noAdjustHandles="1" noChangeArrowheads="1" noChangeShapeType="1" noTextEdit="1"/>
+              </p:cNvSpPr>
+              <p:nvPr>
+                <p:ph idx="1"/>
+              </p:nvPr>
+            </p:nvSpPr>
+            <p:spPr>
+              <a:blipFill>
+                <a:blip r:embed="rId2"/>
+                <a:stretch>
+                  <a:fillRect l="-1217" t="-2241" r="-696"/>
+                </a:stretch>
+              </a:blipFill>
+            </p:spPr>
+            <p:txBody>
+              <a:bodyPr/>
+              <a:lstStyle/>
+              <a:p>
+                <a:r>
+                  <a:rPr lang="en-US">
+                    <a:noFill/>
+                  </a:rPr>
+                  <a:t> </a:t>
+                </a:r>
+              </a:p>
+            </p:txBody>
+          </p:sp>
+        </mc:Fallback>
+      </mc:AlternateContent>
+    </p:spTree>
+    <p:extLst>
+      <p:ext uri="{BB962C8B-B14F-4D97-AF65-F5344CB8AC3E}">
+        <p14:creationId xmlns:p14="http://schemas.microsoft.com/office/powerpoint/2010/main" val="612692371"/>
+      </p:ext>
+    </p:extLst>
+  </p:cSld>
+  <p:clrMapOvr>
+    <a:masterClrMapping/>
+  </p:clrMapOvr>
+</p:sld>
+</file>
+
+<file path=ppt/slides/slide16.xml><?xml version="1.0" encoding="utf-8"?>
+<p:sld xmlns:a="http://schemas.openxmlformats.org/drawingml/2006/main" xmlns:r="http://schemas.openxmlformats.org/officeDocument/2006/relationships" xmlns:p="http://schemas.openxmlformats.org/presentationml/2006/main">
+  <p:cSld>
+    <p:spTree>
+      <p:nvGrpSpPr>
+        <p:cNvPr id="1" name=""/>
+        <p:cNvGrpSpPr/>
+        <p:nvPr/>
+      </p:nvGrpSpPr>
+      <p:grpSpPr>
+        <a:xfrm>
+          <a:off x="0" y="0"/>
+          <a:ext cx="0" cy="0"/>
+          <a:chOff x="0" y="0"/>
+          <a:chExt cx="0" cy="0"/>
+        </a:xfrm>
+      </p:grpSpPr>
+      <p:sp>
+        <p:nvSpPr>
+          <p:cNvPr id="3" name="Content Placeholder 2">
+            <a:extLst>
+              <a:ext uri="{FF2B5EF4-FFF2-40B4-BE49-F238E27FC236}">
+                <a16:creationId xmlns:a16="http://schemas.microsoft.com/office/drawing/2014/main" id="{7496A2C8-366B-4719-B685-2F871CD8A5EC}"/>
+              </a:ext>
+            </a:extLst>
+          </p:cNvPr>
+          <p:cNvSpPr>
+            <a:spLocks noGrp="1"/>
+          </p:cNvSpPr>
+          <p:nvPr>
+            <p:ph idx="1"/>
+          </p:nvPr>
+        </p:nvSpPr>
+        <p:spPr/>
+        <p:txBody>
+          <a:bodyPr/>
+          <a:lstStyle/>
+          <a:p>
+            <a:pPr marL="0" indent="0">
+              <a:buNone/>
+            </a:pPr>
+            <a:r>
+              <a:rPr lang="en-US" dirty="0"/>
+              <a:t>Two blocks are connected by a massless rope and hung over a frictionless pulley in the shape of a solid cylinder. There is no slipping between the cord and the surface of the pulley. The blocks have mass of 3.0 kg and 5.7 kg, and the pulley has a radius of 0.12m and a mass of 10.3 kg. At the instant the 5.7 kg mass has fallen 1.5 m starting from rest</a:t>
+            </a:r>
+          </a:p>
+          <a:p>
+            <a:pPr marL="514350" indent="-514350">
+              <a:buFont typeface="+mj-lt"/>
+              <a:buAutoNum type="arabicPeriod"/>
+            </a:pPr>
+            <a:r>
+              <a:rPr lang="en-US" dirty="0"/>
+              <a:t>Find the speed of each block. (2.39 m/s)</a:t>
+            </a:r>
+          </a:p>
+          <a:p>
+            <a:pPr marL="514350" indent="-514350">
+              <a:buFont typeface="+mj-lt"/>
+              <a:buAutoNum type="arabicPeriod"/>
+            </a:pPr>
+            <a:r>
+              <a:rPr lang="en-US" dirty="0"/>
+              <a:t>Find the acceleration of the pulley (4.37 m/s</a:t>
+            </a:r>
+            <a:r>
+              <a:rPr lang="en-US" baseline="30000" dirty="0"/>
+              <a:t>2</a:t>
+            </a:r>
+            <a:r>
+              <a:rPr lang="en-US" dirty="0"/>
+              <a:t>)</a:t>
+            </a:r>
+          </a:p>
+          <a:p>
+            <a:pPr marL="514350" indent="-514350">
+              <a:buFont typeface="+mj-lt"/>
+              <a:buAutoNum type="arabicPeriod"/>
+            </a:pPr>
+            <a:r>
+              <a:rPr lang="en-US" dirty="0"/>
+              <a:t>Find the kinetic energy of the pulley (14.76 J)</a:t>
+            </a:r>
+          </a:p>
+        </p:txBody>
+      </p:sp>
+    </p:spTree>
+    <p:extLst>
+      <p:ext uri="{BB962C8B-B14F-4D97-AF65-F5344CB8AC3E}">
+        <p14:creationId xmlns:p14="http://schemas.microsoft.com/office/powerpoint/2010/main" val="1122051640"/>
+      </p:ext>
+    </p:extLst>
+  </p:cSld>
+  <p:clrMapOvr>
+    <a:masterClrMapping/>
+  </p:clrMapOvr>
+</p:sld>
+</file>
+
+<file path=ppt/slides/slide17.xml><?xml version="1.0" encoding="utf-8"?>
+<p:sld xmlns:a="http://schemas.openxmlformats.org/drawingml/2006/main" xmlns:r="http://schemas.openxmlformats.org/officeDocument/2006/relationships" xmlns:p="http://schemas.openxmlformats.org/presentationml/2006/main">
+  <p:cSld>
+    <p:spTree>
+      <p:nvGrpSpPr>
+        <p:cNvPr id="1" name=""/>
+        <p:cNvGrpSpPr/>
+        <p:nvPr/>
+      </p:nvGrpSpPr>
+      <p:grpSpPr>
+        <a:xfrm>
+          <a:off x="0" y="0"/>
+          <a:ext cx="0" cy="0"/>
+          <a:chOff x="0" y="0"/>
+          <a:chExt cx="0" cy="0"/>
+        </a:xfrm>
+      </p:grpSpPr>
+      <p:sp>
+        <p:nvSpPr>
+          <p:cNvPr id="3" name="Content Placeholder 2">
+            <a:extLst>
+              <a:ext uri="{FF2B5EF4-FFF2-40B4-BE49-F238E27FC236}">
+                <a16:creationId xmlns:a16="http://schemas.microsoft.com/office/drawing/2014/main" id="{67962D35-D0F8-4DC4-998E-32E0484AD5C7}"/>
+              </a:ext>
+            </a:extLst>
+          </p:cNvPr>
+          <p:cNvSpPr>
+            <a:spLocks noGrp="1"/>
+          </p:cNvSpPr>
+          <p:nvPr>
+            <p:ph idx="1"/>
+          </p:nvPr>
+        </p:nvSpPr>
+        <p:spPr/>
+        <p:txBody>
+          <a:bodyPr/>
+          <a:lstStyle/>
+          <a:p>
+            <a:pPr marL="0" indent="0">
+              <a:buNone/>
+            </a:pPr>
+            <a:r>
+              <a:rPr lang="en-US" dirty="0"/>
+              <a:t>Two blocks are connected by a massless string wrapped over a pulley. The pulley has a mass of 5 kg and a radius of 2 m. One block with mass 10kg rests on a frictionless inclined plane which makes an angle of 30 degrees with the horizontal, while the other with a mass of 11 kg hangs over the edge of the plane. </a:t>
+            </a:r>
+          </a:p>
+          <a:p>
+            <a:pPr marL="514350" indent="-514350">
+              <a:buFont typeface="+mj-lt"/>
+              <a:buAutoNum type="arabicPeriod"/>
+            </a:pPr>
+            <a:r>
+              <a:rPr lang="en-US" dirty="0"/>
+              <a:t>Find the acceleration of the blocks (7.87 m/s</a:t>
+            </a:r>
+            <a:r>
+              <a:rPr lang="en-US" baseline="30000" dirty="0"/>
+              <a:t>2</a:t>
+            </a:r>
+            <a:r>
+              <a:rPr lang="en-US" dirty="0"/>
+              <a:t>)</a:t>
+            </a:r>
+          </a:p>
+          <a:p>
+            <a:pPr marL="514350" indent="-514350">
+              <a:buFont typeface="+mj-lt"/>
+              <a:buAutoNum type="arabicPeriod"/>
+            </a:pPr>
+            <a:r>
+              <a:rPr lang="en-US" dirty="0"/>
+              <a:t>Find the torque acting on the pulley (39.35 N*m)</a:t>
+            </a:r>
+          </a:p>
+          <a:p>
+            <a:pPr marL="514350" indent="-514350">
+              <a:buFont typeface="+mj-lt"/>
+              <a:buAutoNum type="arabicPeriod"/>
+            </a:pPr>
+            <a:endParaRPr lang="en-US" dirty="0"/>
+          </a:p>
+        </p:txBody>
+      </p:sp>
+    </p:spTree>
+    <p:extLst>
+      <p:ext uri="{BB962C8B-B14F-4D97-AF65-F5344CB8AC3E}">
+        <p14:creationId xmlns:p14="http://schemas.microsoft.com/office/powerpoint/2010/main" val="3031455939"/>
+      </p:ext>
+    </p:extLst>
+  </p:cSld>
+  <p:clrMapOvr>
+    <a:masterClrMapping/>
+  </p:clrMapOvr>
+</p:sld>
+</file>
+
+<file path=ppt/slides/slide18.xml><?xml version="1.0" encoding="utf-8"?>
+<p:sld xmlns:a="http://schemas.openxmlformats.org/drawingml/2006/main" xmlns:r="http://schemas.openxmlformats.org/officeDocument/2006/relationships" xmlns:p="http://schemas.openxmlformats.org/presentationml/2006/main">
+  <p:cSld>
+    <p:spTree>
+      <p:nvGrpSpPr>
+        <p:cNvPr id="1" name=""/>
+        <p:cNvGrpSpPr/>
+        <p:nvPr/>
+      </p:nvGrpSpPr>
+      <p:grpSpPr>
+        <a:xfrm>
+          <a:off x="0" y="0"/>
+          <a:ext cx="0" cy="0"/>
+          <a:chOff x="0" y="0"/>
+          <a:chExt cx="0" cy="0"/>
+        </a:xfrm>
+      </p:grpSpPr>
+      <p:sp>
+        <p:nvSpPr>
+          <p:cNvPr id="3" name="Content Placeholder 2">
+            <a:extLst>
+              <a:ext uri="{FF2B5EF4-FFF2-40B4-BE49-F238E27FC236}">
+                <a16:creationId xmlns:a16="http://schemas.microsoft.com/office/drawing/2014/main" id="{FA5870AD-09C6-4036-8209-14807F502B8D}"/>
+              </a:ext>
+            </a:extLst>
+          </p:cNvPr>
+          <p:cNvSpPr>
+            <a:spLocks noGrp="1"/>
+          </p:cNvSpPr>
+          <p:nvPr>
+            <p:ph idx="1"/>
+          </p:nvPr>
+        </p:nvSpPr>
+        <p:spPr/>
+        <p:txBody>
+          <a:bodyPr/>
+          <a:lstStyle/>
+          <a:p>
+            <a:pPr marL="0" indent="0">
+              <a:buNone/>
+            </a:pPr>
+            <a:r>
+              <a:rPr lang="en-US" dirty="0"/>
+              <a:t>A thin rod with mass 100kg length 5 meters is fixed at one end of its length to a hinge joint with a vertical axis (meaning it is able to rotate in the horizontal plane about that end without friction). The free end of the rod is struck by a 10 kg magnet, which sticks to the tip of the beam, travelling at 50 m/s.</a:t>
+            </a:r>
+          </a:p>
+          <a:p>
+            <a:pPr marL="514350" indent="-514350">
+              <a:buFont typeface="+mj-lt"/>
+              <a:buAutoNum type="arabicPeriod"/>
+            </a:pPr>
+            <a:r>
+              <a:rPr lang="en-US" dirty="0"/>
+              <a:t>What is the angular velocity of the beam after impact? (2.31 rad/s)</a:t>
+            </a:r>
+          </a:p>
+        </p:txBody>
+      </p:sp>
+    </p:spTree>
+    <p:extLst>
+      <p:ext uri="{BB962C8B-B14F-4D97-AF65-F5344CB8AC3E}">
+        <p14:creationId xmlns:p14="http://schemas.microsoft.com/office/powerpoint/2010/main" val="2709019465"/>
+      </p:ext>
+    </p:extLst>
+  </p:cSld>
+  <p:clrMapOvr>
+    <a:masterClrMapping/>
+  </p:clrMapOvr>
+</p:sld>
+</file>
+
+<file path=ppt/slides/slide19.xml><?xml version="1.0" encoding="utf-8"?>
+<p:sld xmlns:a="http://schemas.openxmlformats.org/drawingml/2006/main" xmlns:r="http://schemas.openxmlformats.org/officeDocument/2006/relationships" xmlns:p="http://schemas.openxmlformats.org/presentationml/2006/main">
+  <p:cSld>
+    <p:spTree>
+      <p:nvGrpSpPr>
+        <p:cNvPr id="1" name=""/>
+        <p:cNvGrpSpPr/>
+        <p:nvPr/>
+      </p:nvGrpSpPr>
+      <p:grpSpPr>
+        <a:xfrm>
+          <a:off x="0" y="0"/>
+          <a:ext cx="0" cy="0"/>
+          <a:chOff x="0" y="0"/>
+          <a:chExt cx="0" cy="0"/>
+        </a:xfrm>
+      </p:grpSpPr>
+      <p:sp>
+        <p:nvSpPr>
+          <p:cNvPr id="3" name="Content Placeholder 2">
+            <a:extLst>
+              <a:ext uri="{FF2B5EF4-FFF2-40B4-BE49-F238E27FC236}">
+                <a16:creationId xmlns:a16="http://schemas.microsoft.com/office/drawing/2014/main" id="{DF26F617-D569-4D9D-8AB8-F8ABD93798EB}"/>
+              </a:ext>
+            </a:extLst>
+          </p:cNvPr>
+          <p:cNvSpPr>
+            <a:spLocks noGrp="1"/>
+          </p:cNvSpPr>
+          <p:nvPr>
+            <p:ph idx="1"/>
+          </p:nvPr>
+        </p:nvSpPr>
+        <p:spPr>
+          <a:xfrm>
+            <a:off x="838200" y="1825625"/>
+            <a:ext cx="10515600" cy="4351338"/>
+          </a:xfrm>
+        </p:spPr>
+        <p:txBody>
+          <a:bodyPr/>
+          <a:lstStyle/>
+          <a:p>
+            <a:pPr marL="0" indent="0">
+              <a:buNone/>
+            </a:pPr>
+            <a:r>
+              <a:rPr lang="en-US" dirty="0"/>
+              <a:t>A man holds a 2 m long, 10 kg bar with one hand placed at the left end of the bar, and the other placed 0.5 m from the left end.</a:t>
+            </a:r>
+          </a:p>
+          <a:p>
+            <a:pPr marL="514350" indent="-514350">
+              <a:buFont typeface="+mj-lt"/>
+              <a:buAutoNum type="arabicPeriod"/>
+            </a:pPr>
+            <a:r>
+              <a:rPr lang="en-US" dirty="0"/>
+              <a:t>Find the magnitudes and directions of the forces his hands exert on </a:t>
+            </a:r>
+            <a:r>
+              <a:rPr lang="en-US"/>
+              <a:t>the bar (-98 N, 196 N)</a:t>
+            </a:r>
+            <a:endParaRPr lang="en-US" dirty="0"/>
+          </a:p>
+          <a:p>
+            <a:pPr marL="0" indent="0">
+              <a:buNone/>
+            </a:pPr>
+            <a:r>
+              <a:rPr lang="en-US" dirty="0"/>
+              <a:t>If three 20 kg weights are added to the left end of the bar, such that the first weight is at the end, the second is 0.33 m from the end, and the third is 0.66 m from the end, assuming he keeps his hands in the same place,</a:t>
+            </a:r>
+          </a:p>
+          <a:p>
+            <a:pPr marL="514350" indent="-514350">
+              <a:buFont typeface="+mj-lt"/>
+              <a:buAutoNum type="arabicPeriod" startAt="2"/>
+            </a:pPr>
+            <a:r>
+              <a:rPr lang="en-US" dirty="0"/>
+              <a:t>Find the magnitudes and directions of the forces his hands exert on the bar</a:t>
+            </a:r>
+          </a:p>
+        </p:txBody>
+      </p:sp>
+    </p:spTree>
+    <p:extLst>
+      <p:ext uri="{BB962C8B-B14F-4D97-AF65-F5344CB8AC3E}">
+        <p14:creationId xmlns:p14="http://schemas.microsoft.com/office/powerpoint/2010/main" val="1902125157"/>
+      </p:ext>
+    </p:extLst>
+  </p:cSld>
+  <p:clrMapOvr>
+    <a:masterClrMapping/>
+  </p:clrMapOvr>
+</p:sld>
+</file>
+
 <file path=ppt/slides/slide2.xml><?xml version="1.0" encoding="utf-8"?>
 <p:sld xmlns:a="http://schemas.openxmlformats.org/drawingml/2006/main" xmlns:r="http://schemas.openxmlformats.org/officeDocument/2006/relationships" xmlns:p="http://schemas.openxmlformats.org/presentationml/2006/main">
   <p:cSld>
@@ -3958,8 +4652,8 @@
           </a:p>
         </p:txBody>
       </p:sp>
-      <mc:AlternateContent xmlns:mc="http://schemas.openxmlformats.org/markup-compatibility/2006">
-        <mc:Choice xmlns:a14="http://schemas.microsoft.com/office/drawing/2010/main" Requires="a14">
+      <mc:AlternateContent xmlns:mc="http://schemas.openxmlformats.org/markup-compatibility/2006" xmlns:a14="http://schemas.microsoft.com/office/drawing/2010/main">
+        <mc:Choice Requires="a14">
           <p:graphicFrame>
             <p:nvGraphicFramePr>
               <p:cNvPr id="4" name="Content Placeholder 3">
@@ -4344,7 +5038,7 @@
             </a:graphic>
           </p:graphicFrame>
         </mc:Choice>
-        <mc:Fallback>
+        <mc:Fallback xmlns="">
           <p:graphicFrame>
             <p:nvGraphicFramePr>
               <p:cNvPr id="4" name="Content Placeholder 3">
@@ -4640,6 +5334,75 @@
     <p:extLst>
       <p:ext uri="{BB962C8B-B14F-4D97-AF65-F5344CB8AC3E}">
         <p14:creationId xmlns:p14="http://schemas.microsoft.com/office/powerpoint/2010/main" val="2056663136"/>
+      </p:ext>
+    </p:extLst>
+  </p:cSld>
+  <p:clrMapOvr>
+    <a:masterClrMapping/>
+  </p:clrMapOvr>
+</p:sld>
+</file>
+
+<file path=ppt/slides/slide20.xml><?xml version="1.0" encoding="utf-8"?>
+<p:sld xmlns:a="http://schemas.openxmlformats.org/drawingml/2006/main" xmlns:r="http://schemas.openxmlformats.org/officeDocument/2006/relationships" xmlns:p="http://schemas.openxmlformats.org/presentationml/2006/main">
+  <p:cSld>
+    <p:spTree>
+      <p:nvGrpSpPr>
+        <p:cNvPr id="1" name=""/>
+        <p:cNvGrpSpPr/>
+        <p:nvPr/>
+      </p:nvGrpSpPr>
+      <p:grpSpPr>
+        <a:xfrm>
+          <a:off x="0" y="0"/>
+          <a:ext cx="0" cy="0"/>
+          <a:chOff x="0" y="0"/>
+          <a:chExt cx="0" cy="0"/>
+        </a:xfrm>
+      </p:grpSpPr>
+      <p:sp>
+        <p:nvSpPr>
+          <p:cNvPr id="3" name="Content Placeholder 2">
+            <a:extLst>
+              <a:ext uri="{FF2B5EF4-FFF2-40B4-BE49-F238E27FC236}">
+                <a16:creationId xmlns:a16="http://schemas.microsoft.com/office/drawing/2014/main" id="{87FD3E30-452E-4F9A-B94C-9BD25D913AB3}"/>
+              </a:ext>
+            </a:extLst>
+          </p:cNvPr>
+          <p:cNvSpPr>
+            <a:spLocks noGrp="1"/>
+          </p:cNvSpPr>
+          <p:nvPr>
+            <p:ph idx="1"/>
+          </p:nvPr>
+        </p:nvSpPr>
+        <p:spPr/>
+        <p:txBody>
+          <a:bodyPr/>
+          <a:lstStyle/>
+          <a:p>
+            <a:pPr marL="0" indent="0">
+              <a:buNone/>
+            </a:pPr>
+            <a:r>
+              <a:rPr lang="en-US" dirty="0"/>
+              <a:t>If a light cable with a diameter of 1 cm has an elastic modulus of 100,000 </a:t>
+            </a:r>
+            <a:r>
+              <a:rPr lang="en-US" dirty="0" err="1"/>
+              <a:t>Mpa</a:t>
+            </a:r>
+            <a:r>
+              <a:rPr lang="en-US" dirty="0"/>
+              <a:t>, and is fixed at one end to a ceiling while a 1000 kg weight hangs from the other end, find the strain in the cable. (.0012 m)</a:t>
+            </a:r>
+          </a:p>
+        </p:txBody>
+      </p:sp>
+    </p:spTree>
+    <p:extLst>
+      <p:ext uri="{BB962C8B-B14F-4D97-AF65-F5344CB8AC3E}">
+        <p14:creationId xmlns:p14="http://schemas.microsoft.com/office/powerpoint/2010/main" val="3199747933"/>
       </p:ext>
     </p:extLst>
   </p:cSld>
@@ -6949,8 +7712,8 @@
           </a:p>
         </p:txBody>
       </p:sp>
-      <mc:AlternateContent xmlns:mc="http://schemas.openxmlformats.org/markup-compatibility/2006">
-        <mc:Choice xmlns:a14="http://schemas.microsoft.com/office/drawing/2010/main" Requires="a14">
+      <mc:AlternateContent xmlns:mc="http://schemas.openxmlformats.org/markup-compatibility/2006" xmlns:a14="http://schemas.microsoft.com/office/drawing/2010/main">
+        <mc:Choice Requires="a14">
           <p:sp>
             <p:nvSpPr>
               <p:cNvPr id="3" name="Content Placeholder 2">
@@ -6979,7 +7742,6 @@
               </a:bodyPr>
               <a:lstStyle/>
               <a:p>
-                <a:pPr/>
                 <a14:m>
                   <m:oMath xmlns:m="http://schemas.openxmlformats.org/officeDocument/2006/math">
                     <m:r>
@@ -7239,7 +8001,7 @@
             </p:txBody>
           </p:sp>
         </mc:Choice>
-        <mc:Fallback>
+        <mc:Fallback xmlns="">
           <p:sp>
             <p:nvSpPr>
               <p:cNvPr id="3" name="Content Placeholder 2">
@@ -7345,8 +8107,8 @@
           </a:p>
         </p:txBody>
       </p:sp>
-      <mc:AlternateContent xmlns:mc="http://schemas.openxmlformats.org/markup-compatibility/2006">
-        <mc:Choice xmlns:a14="http://schemas.microsoft.com/office/drawing/2010/main" Requires="a14">
+      <mc:AlternateContent xmlns:mc="http://schemas.openxmlformats.org/markup-compatibility/2006" xmlns:a14="http://schemas.microsoft.com/office/drawing/2010/main">
+        <mc:Choice Requires="a14">
           <p:graphicFrame>
             <p:nvGraphicFramePr>
               <p:cNvPr id="4" name="Content Placeholder 3">
@@ -7433,6 +8195,7 @@
                         <a:bodyPr/>
                         <a:lstStyle/>
                         <a:p>
+                          <a:pPr/>
                           <a14:m>
                             <m:oMathPara xmlns:m="http://schemas.openxmlformats.org/officeDocument/2006/math">
                               <m:oMathParaPr>
@@ -7520,6 +8283,7 @@
                         <a:bodyPr/>
                         <a:lstStyle/>
                         <a:p>
+                          <a:pPr/>
                           <a14:m>
                             <m:oMathPara xmlns:m="http://schemas.openxmlformats.org/officeDocument/2006/math">
                               <m:oMathParaPr>
@@ -7613,7 +8377,7 @@
             </a:graphic>
           </p:graphicFrame>
         </mc:Choice>
-        <mc:Fallback>
+        <mc:Fallback xmlns="">
           <p:graphicFrame>
             <p:nvGraphicFramePr>
               <p:cNvPr id="4" name="Content Placeholder 3">
@@ -7799,8 +8563,8 @@
           </a:p>
         </p:txBody>
       </p:sp>
-      <mc:AlternateContent xmlns:mc="http://schemas.openxmlformats.org/markup-compatibility/2006">
-        <mc:Choice xmlns:a14="http://schemas.microsoft.com/office/drawing/2010/main" Requires="a14">
+      <mc:AlternateContent xmlns:mc="http://schemas.openxmlformats.org/markup-compatibility/2006" xmlns:a14="http://schemas.microsoft.com/office/drawing/2010/main">
+        <mc:Choice Requires="a14">
           <p:sp>
             <p:nvSpPr>
               <p:cNvPr id="3" name="Content Placeholder 2">
@@ -7912,7 +8676,7 @@
             </p:txBody>
           </p:sp>
         </mc:Choice>
-        <mc:Fallback>
+        <mc:Fallback xmlns="">
           <p:sp>
             <p:nvSpPr>
               <p:cNvPr id="3" name="Content Placeholder 2">
@@ -7952,8 +8716,8 @@
           </p:sp>
         </mc:Fallback>
       </mc:AlternateContent>
-      <mc:AlternateContent xmlns:mc="http://schemas.openxmlformats.org/markup-compatibility/2006">
-        <mc:Choice xmlns:a14="http://schemas.microsoft.com/office/drawing/2010/main" Requires="a14">
+      <mc:AlternateContent xmlns:mc="http://schemas.openxmlformats.org/markup-compatibility/2006" xmlns:a14="http://schemas.microsoft.com/office/drawing/2010/main">
+        <mc:Choice Requires="a14">
           <p:graphicFrame>
             <p:nvGraphicFramePr>
               <p:cNvPr id="4" name="Content Placeholder 3">
@@ -8039,6 +8803,7 @@
                         <a:bodyPr/>
                         <a:lstStyle/>
                         <a:p>
+                          <a:pPr/>
                           <a14:m>
                             <m:oMathPara xmlns:m="http://schemas.openxmlformats.org/officeDocument/2006/math">
                               <m:oMathParaPr>
@@ -8076,6 +8841,7 @@
                         <a:bodyPr/>
                         <a:lstStyle/>
                         <a:p>
+                          <a:pPr/>
                           <a14:m>
                             <m:oMathPara xmlns:m="http://schemas.openxmlformats.org/officeDocument/2006/math">
                               <m:oMathParaPr>
@@ -8126,6 +8892,7 @@
                         <a:bodyPr/>
                         <a:lstStyle/>
                         <a:p>
+                          <a:pPr/>
                           <a14:m>
                             <m:oMathPara xmlns:m="http://schemas.openxmlformats.org/officeDocument/2006/math">
                               <m:oMathParaPr>
@@ -8163,6 +8930,7 @@
                         <a:bodyPr/>
                         <a:lstStyle/>
                         <a:p>
+                          <a:pPr/>
                           <a14:m>
                             <m:oMathPara xmlns:m="http://schemas.openxmlformats.org/officeDocument/2006/math">
                               <m:oMathParaPr>
@@ -8206,7 +8974,7 @@
             </a:graphic>
           </p:graphicFrame>
         </mc:Choice>
-        <mc:Fallback>
+        <mc:Fallback xmlns="">
           <p:graphicFrame>
             <p:nvGraphicFramePr>
               <p:cNvPr id="4" name="Content Placeholder 3">
@@ -8432,8 +9200,8 @@
           </a:p>
         </p:txBody>
       </p:sp>
-      <mc:AlternateContent xmlns:mc="http://schemas.openxmlformats.org/markup-compatibility/2006">
-        <mc:Choice xmlns:a14="http://schemas.microsoft.com/office/drawing/2010/main" Requires="a14">
+      <mc:AlternateContent xmlns:mc="http://schemas.openxmlformats.org/markup-compatibility/2006" xmlns:a14="http://schemas.microsoft.com/office/drawing/2010/main">
+        <mc:Choice Requires="a14">
           <p:graphicFrame>
             <p:nvGraphicFramePr>
               <p:cNvPr id="5" name="Content Placeholder 4">
@@ -8520,6 +9288,7 @@
                         <a:bodyPr/>
                         <a:lstStyle/>
                         <a:p>
+                          <a:pPr/>
                           <a14:m>
                             <m:oMathPara xmlns:m="http://schemas.openxmlformats.org/officeDocument/2006/math">
                               <m:oMathParaPr>
@@ -8587,6 +9356,7 @@
                         <a:bodyPr/>
                         <a:lstStyle/>
                         <a:p>
+                          <a:pPr/>
                           <a14:m>
                             <m:oMathPara xmlns:m="http://schemas.openxmlformats.org/officeDocument/2006/math">
                               <m:oMathParaPr>
@@ -8710,6 +9480,7 @@
                         <a:bodyPr/>
                         <a:lstStyle/>
                         <a:p>
+                          <a:pPr/>
                           <a14:m>
                             <m:oMathPara xmlns:m="http://schemas.openxmlformats.org/officeDocument/2006/math">
                               <m:oMathParaPr>
@@ -8766,6 +9537,7 @@
                         <a:bodyPr/>
                         <a:lstStyle/>
                         <a:p>
+                          <a:pPr/>
                           <a14:m>
                             <m:oMathPara xmlns:m="http://schemas.openxmlformats.org/officeDocument/2006/math">
                               <m:oMathParaPr>
@@ -8828,7 +9600,7 @@
             </a:graphic>
           </p:graphicFrame>
         </mc:Choice>
-        <mc:Fallback>
+        <mc:Fallback xmlns="">
           <p:graphicFrame>
             <p:nvGraphicFramePr>
               <p:cNvPr id="5" name="Content Placeholder 4">
@@ -9055,8 +9827,8 @@
           </a:p>
         </p:txBody>
       </p:sp>
-      <mc:AlternateContent xmlns:mc="http://schemas.openxmlformats.org/markup-compatibility/2006">
-        <mc:Choice xmlns:a14="http://schemas.microsoft.com/office/drawing/2010/main" Requires="a14">
+      <mc:AlternateContent xmlns:mc="http://schemas.openxmlformats.org/markup-compatibility/2006" xmlns:a14="http://schemas.microsoft.com/office/drawing/2010/main">
+        <mc:Choice Requires="a14">
           <p:sp>
             <p:nvSpPr>
               <p:cNvPr id="3" name="Content Placeholder 2">
@@ -9562,7 +10334,7 @@
             </p:txBody>
           </p:sp>
         </mc:Choice>
-        <mc:Fallback>
+        <mc:Fallback xmlns="">
           <p:sp>
             <p:nvSpPr>
               <p:cNvPr id="3" name="Content Placeholder 2">

</xml_diff>